<commit_message>
Improved phrasing of one slide
</commit_message>
<xml_diff>
--- a/presentation/salesforce_presentation.pptx
+++ b/presentation/salesforce_presentation.pptx
@@ -121,6 +121,11 @@
       </a:defRPr>
     </a:lvl9pPr>
   </p:defaultTextStyle>
+  <p:extLst>
+    <p:ext uri="{EFAFB233-063F-42B5-8137-9DF3F51BA10A}">
+      <p15:sldGuideLst xmlns:p15="http://schemas.microsoft.com/office/powerpoint/2012/main"/>
+    </p:ext>
+  </p:extLst>
 </p:presentation>
 </file>
 
@@ -271,7 +276,7 @@
           <a:p>
             <a:fld id="{75F949A0-D2CF-4D20-B375-7E5A618C650D}" type="datetimeFigureOut">
               <a:rPr lang="en-US" smtClean="0"/>
-              <a:t>11/17/2024</a:t>
+              <a:t>11/18/2024</a:t>
             </a:fld>
             <a:endParaRPr lang="en-US"/>
           </a:p>
@@ -469,7 +474,7 @@
           <a:p>
             <a:fld id="{75F949A0-D2CF-4D20-B375-7E5A618C650D}" type="datetimeFigureOut">
               <a:rPr lang="en-US" smtClean="0"/>
-              <a:t>11/17/2024</a:t>
+              <a:t>11/18/2024</a:t>
             </a:fld>
             <a:endParaRPr lang="en-US"/>
           </a:p>
@@ -677,7 +682,7 @@
           <a:p>
             <a:fld id="{75F949A0-D2CF-4D20-B375-7E5A618C650D}" type="datetimeFigureOut">
               <a:rPr lang="en-US" smtClean="0"/>
-              <a:t>11/17/2024</a:t>
+              <a:t>11/18/2024</a:t>
             </a:fld>
             <a:endParaRPr lang="en-US"/>
           </a:p>
@@ -875,7 +880,7 @@
           <a:p>
             <a:fld id="{75F949A0-D2CF-4D20-B375-7E5A618C650D}" type="datetimeFigureOut">
               <a:rPr lang="en-US" smtClean="0"/>
-              <a:t>11/17/2024</a:t>
+              <a:t>11/18/2024</a:t>
             </a:fld>
             <a:endParaRPr lang="en-US"/>
           </a:p>
@@ -1150,7 +1155,7 @@
           <a:p>
             <a:fld id="{75F949A0-D2CF-4D20-B375-7E5A618C650D}" type="datetimeFigureOut">
               <a:rPr lang="en-US" smtClean="0"/>
-              <a:t>11/17/2024</a:t>
+              <a:t>11/18/2024</a:t>
             </a:fld>
             <a:endParaRPr lang="en-US"/>
           </a:p>
@@ -1415,7 +1420,7 @@
           <a:p>
             <a:fld id="{75F949A0-D2CF-4D20-B375-7E5A618C650D}" type="datetimeFigureOut">
               <a:rPr lang="en-US" smtClean="0"/>
-              <a:t>11/17/2024</a:t>
+              <a:t>11/18/2024</a:t>
             </a:fld>
             <a:endParaRPr lang="en-US"/>
           </a:p>
@@ -1827,7 +1832,7 @@
           <a:p>
             <a:fld id="{75F949A0-D2CF-4D20-B375-7E5A618C650D}" type="datetimeFigureOut">
               <a:rPr lang="en-US" smtClean="0"/>
-              <a:t>11/17/2024</a:t>
+              <a:t>11/18/2024</a:t>
             </a:fld>
             <a:endParaRPr lang="en-US"/>
           </a:p>
@@ -1968,7 +1973,7 @@
           <a:p>
             <a:fld id="{75F949A0-D2CF-4D20-B375-7E5A618C650D}" type="datetimeFigureOut">
               <a:rPr lang="en-US" smtClean="0"/>
-              <a:t>11/17/2024</a:t>
+              <a:t>11/18/2024</a:t>
             </a:fld>
             <a:endParaRPr lang="en-US"/>
           </a:p>
@@ -2081,7 +2086,7 @@
           <a:p>
             <a:fld id="{75F949A0-D2CF-4D20-B375-7E5A618C650D}" type="datetimeFigureOut">
               <a:rPr lang="en-US" smtClean="0"/>
-              <a:t>11/17/2024</a:t>
+              <a:t>11/18/2024</a:t>
             </a:fld>
             <a:endParaRPr lang="en-US"/>
           </a:p>
@@ -2392,7 +2397,7 @@
           <a:p>
             <a:fld id="{75F949A0-D2CF-4D20-B375-7E5A618C650D}" type="datetimeFigureOut">
               <a:rPr lang="en-US" smtClean="0"/>
-              <a:t>11/17/2024</a:t>
+              <a:t>11/18/2024</a:t>
             </a:fld>
             <a:endParaRPr lang="en-US"/>
           </a:p>
@@ -2680,7 +2685,7 @@
           <a:p>
             <a:fld id="{75F949A0-D2CF-4D20-B375-7E5A618C650D}" type="datetimeFigureOut">
               <a:rPr lang="en-US" smtClean="0"/>
-              <a:t>11/17/2024</a:t>
+              <a:t>11/18/2024</a:t>
             </a:fld>
             <a:endParaRPr lang="en-US"/>
           </a:p>
@@ -2921,7 +2926,7 @@
           <a:p>
             <a:fld id="{75F949A0-D2CF-4D20-B375-7E5A618C650D}" type="datetimeFigureOut">
               <a:rPr lang="en-US" smtClean="0"/>
-              <a:t>11/17/2024</a:t>
+              <a:t>11/18/2024</a:t>
             </a:fld>
             <a:endParaRPr lang="en-US"/>
           </a:p>
@@ -4786,87 +4791,116 @@
             <p:ph type="title"/>
           </p:nvPr>
         </p:nvSpPr>
-        <p:spPr/>
-        <p:txBody>
-          <a:bodyPr/>
-          <a:lstStyle/>
-          <a:p>
-            <a:r>
-              <a:rPr lang="en-US" dirty="0"/>
-              <a:t>Insights and lessons learned</a:t>
-            </a:r>
-          </a:p>
-        </p:txBody>
-      </p:sp>
-      <p:sp>
-        <p:nvSpPr>
-          <p:cNvPr id="3" name="Content Placeholder 2">
-            <a:extLst>
-              <a:ext uri="{FF2B5EF4-FFF2-40B4-BE49-F238E27FC236}">
-                <a16:creationId xmlns:a16="http://schemas.microsoft.com/office/drawing/2014/main" id="{A150BC75-04E0-2496-9077-287A3EB855D8}"/>
-              </a:ext>
-            </a:extLst>
-          </p:cNvPr>
-          <p:cNvSpPr>
-            <a:spLocks noGrp="1"/>
-          </p:cNvSpPr>
-          <p:nvPr>
-            <p:ph idx="1"/>
-          </p:nvPr>
-        </p:nvSpPr>
         <p:spPr>
           <a:xfrm>
-            <a:off x="802105" y="1801562"/>
+            <a:off x="857250" y="365125"/>
+            <a:ext cx="10515600" cy="1325563"/>
+          </a:xfrm>
+        </p:spPr>
+        <p:txBody>
+          <a:bodyPr/>
+          <a:lstStyle/>
+          <a:p>
+            <a:r>
+              <a:rPr lang="en-US" dirty="0"/>
+              <a:t>Insights and lessons learned</a:t>
+            </a:r>
+          </a:p>
+        </p:txBody>
+      </p:sp>
+      <p:sp>
+        <p:nvSpPr>
+          <p:cNvPr id="3" name="Content Placeholder 2">
+            <a:extLst>
+              <a:ext uri="{FF2B5EF4-FFF2-40B4-BE49-F238E27FC236}">
+                <a16:creationId xmlns:a16="http://schemas.microsoft.com/office/drawing/2014/main" id="{A150BC75-04E0-2496-9077-287A3EB855D8}"/>
+              </a:ext>
+            </a:extLst>
+          </p:cNvPr>
+          <p:cNvSpPr>
+            <a:spLocks noGrp="1"/>
+          </p:cNvSpPr>
+          <p:nvPr>
+            <p:ph idx="1"/>
+          </p:nvPr>
+        </p:nvSpPr>
+        <p:spPr>
+          <a:xfrm>
+            <a:off x="922755" y="1858712"/>
             <a:ext cx="10515600" cy="4351338"/>
           </a:xfrm>
         </p:spPr>
         <p:txBody>
-          <a:bodyPr/>
-          <a:lstStyle/>
-          <a:p>
-            <a:r>
-              <a:rPr lang="en-US" dirty="0"/>
-              <a:t>I learned how to generate PDF files using Visualforce</a:t>
-            </a:r>
-          </a:p>
-          <a:p>
-            <a:r>
-              <a:rPr lang="en-US" dirty="0"/>
-              <a:t>I learned how to test Visualforce custom controllers</a:t>
-            </a:r>
-          </a:p>
-          <a:p>
-            <a:r>
-              <a:rPr lang="en-US" dirty="0"/>
-              <a:t>I learned how to send emails automatically using triggers</a:t>
-            </a:r>
-          </a:p>
-          <a:p>
-            <a:r>
-              <a:rPr lang="en-US" dirty="0"/>
-              <a:t>I learned about the standard object called Quote</a:t>
-            </a:r>
-          </a:p>
-          <a:p>
-            <a:r>
-              <a:rPr lang="en-US" dirty="0"/>
-              <a:t>I learned about the standard object called Quote Line Item</a:t>
-            </a:r>
-          </a:p>
-          <a:p>
-            <a:r>
-              <a:rPr lang="en-US" dirty="0"/>
-              <a:t>I learned about the standard object called Price Book</a:t>
-            </a:r>
-          </a:p>
-          <a:p>
+          <a:bodyPr>
+            <a:normAutofit fontScale="92500" lnSpcReduction="20000"/>
+          </a:bodyPr>
+          <a:lstStyle/>
+          <a:p>
+            <a:pPr marL="0" indent="0">
+              <a:buNone/>
+            </a:pPr>
+            <a:r>
+              <a:rPr lang="en-US" dirty="0"/>
+              <a:t>I learned how </a:t>
+            </a:r>
             <a:r>
               <a:rPr lang="en-US"/>
-              <a:t>And finally I </a:t>
-            </a:r>
-            <a:r>
-              <a:rPr lang="en-US" dirty="0"/>
-              <a:t>learned about the standard object called Price Book Entry</a:t>
+              <a:t>to:</a:t>
+            </a:r>
+            <a:endParaRPr lang="en-US" dirty="0"/>
+          </a:p>
+          <a:p>
+            <a:r>
+              <a:rPr lang="en-US" dirty="0"/>
+              <a:t>Generate PDF files using Visualforce</a:t>
+            </a:r>
+          </a:p>
+          <a:p>
+            <a:r>
+              <a:rPr lang="en-US" dirty="0"/>
+              <a:t>Test Visualforce custom controllers</a:t>
+            </a:r>
+          </a:p>
+          <a:p>
+            <a:r>
+              <a:rPr lang="en-US" dirty="0"/>
+              <a:t>Send emails automatically using triggers</a:t>
+            </a:r>
+          </a:p>
+          <a:p>
+            <a:endParaRPr lang="en-US" dirty="0"/>
+          </a:p>
+          <a:p>
+            <a:pPr marL="0" indent="0">
+              <a:buNone/>
+            </a:pPr>
+            <a:r>
+              <a:rPr lang="en-US" dirty="0"/>
+              <a:t>I learned about the existence and usage of the following standard objects:</a:t>
+            </a:r>
+          </a:p>
+          <a:p>
+            <a:r>
+              <a:rPr lang="en-US" dirty="0"/>
+              <a:t>Quote</a:t>
+            </a:r>
+          </a:p>
+          <a:p>
+            <a:r>
+              <a:rPr lang="en-US" dirty="0"/>
+              <a:t>Quote Line Item</a:t>
+            </a:r>
+          </a:p>
+          <a:p>
+            <a:r>
+              <a:rPr lang="en-US" dirty="0"/>
+              <a:t>Price Book</a:t>
+            </a:r>
+          </a:p>
+          <a:p>
+            <a:r>
+              <a:rPr lang="en-US" dirty="0"/>
+              <a:t>Price Book Entry</a:t>
             </a:r>
           </a:p>
           <a:p>

</xml_diff>

<commit_message>
Remove empty slide and corrected some grammar mistakes
</commit_message>
<xml_diff>
--- a/presentation/salesforce_presentation.pptx
+++ b/presentation/salesforce_presentation.pptx
@@ -10,19 +10,18 @@
     <p:sldId id="269" r:id="rId4"/>
     <p:sldId id="270" r:id="rId5"/>
     <p:sldId id="271" r:id="rId6"/>
-    <p:sldId id="272" r:id="rId7"/>
-    <p:sldId id="258" r:id="rId8"/>
-    <p:sldId id="259" r:id="rId9"/>
-    <p:sldId id="260" r:id="rId10"/>
-    <p:sldId id="261" r:id="rId11"/>
-    <p:sldId id="262" r:id="rId12"/>
-    <p:sldId id="263" r:id="rId13"/>
-    <p:sldId id="264" r:id="rId14"/>
-    <p:sldId id="265" r:id="rId15"/>
-    <p:sldId id="266" r:id="rId16"/>
-    <p:sldId id="267" r:id="rId17"/>
-    <p:sldId id="268" r:id="rId18"/>
-    <p:sldId id="273" r:id="rId19"/>
+    <p:sldId id="258" r:id="rId7"/>
+    <p:sldId id="259" r:id="rId8"/>
+    <p:sldId id="260" r:id="rId9"/>
+    <p:sldId id="261" r:id="rId10"/>
+    <p:sldId id="262" r:id="rId11"/>
+    <p:sldId id="263" r:id="rId12"/>
+    <p:sldId id="264" r:id="rId13"/>
+    <p:sldId id="265" r:id="rId14"/>
+    <p:sldId id="266" r:id="rId15"/>
+    <p:sldId id="267" r:id="rId16"/>
+    <p:sldId id="268" r:id="rId17"/>
+    <p:sldId id="273" r:id="rId18"/>
   </p:sldIdLst>
   <p:sldSz cx="12192000" cy="6858000"/>
   <p:notesSz cx="6858000" cy="9144000"/>
@@ -276,7 +275,7 @@
           <a:p>
             <a:fld id="{75F949A0-D2CF-4D20-B375-7E5A618C650D}" type="datetimeFigureOut">
               <a:rPr lang="en-US" smtClean="0"/>
-              <a:t>11/18/2024</a:t>
+              <a:t>11/21/2024</a:t>
             </a:fld>
             <a:endParaRPr lang="en-US"/>
           </a:p>
@@ -474,7 +473,7 @@
           <a:p>
             <a:fld id="{75F949A0-D2CF-4D20-B375-7E5A618C650D}" type="datetimeFigureOut">
               <a:rPr lang="en-US" smtClean="0"/>
-              <a:t>11/18/2024</a:t>
+              <a:t>11/21/2024</a:t>
             </a:fld>
             <a:endParaRPr lang="en-US"/>
           </a:p>
@@ -682,7 +681,7 @@
           <a:p>
             <a:fld id="{75F949A0-D2CF-4D20-B375-7E5A618C650D}" type="datetimeFigureOut">
               <a:rPr lang="en-US" smtClean="0"/>
-              <a:t>11/18/2024</a:t>
+              <a:t>11/21/2024</a:t>
             </a:fld>
             <a:endParaRPr lang="en-US"/>
           </a:p>
@@ -880,7 +879,7 @@
           <a:p>
             <a:fld id="{75F949A0-D2CF-4D20-B375-7E5A618C650D}" type="datetimeFigureOut">
               <a:rPr lang="en-US" smtClean="0"/>
-              <a:t>11/18/2024</a:t>
+              <a:t>11/21/2024</a:t>
             </a:fld>
             <a:endParaRPr lang="en-US"/>
           </a:p>
@@ -1155,7 +1154,7 @@
           <a:p>
             <a:fld id="{75F949A0-D2CF-4D20-B375-7E5A618C650D}" type="datetimeFigureOut">
               <a:rPr lang="en-US" smtClean="0"/>
-              <a:t>11/18/2024</a:t>
+              <a:t>11/21/2024</a:t>
             </a:fld>
             <a:endParaRPr lang="en-US"/>
           </a:p>
@@ -1420,7 +1419,7 @@
           <a:p>
             <a:fld id="{75F949A0-D2CF-4D20-B375-7E5A618C650D}" type="datetimeFigureOut">
               <a:rPr lang="en-US" smtClean="0"/>
-              <a:t>11/18/2024</a:t>
+              <a:t>11/21/2024</a:t>
             </a:fld>
             <a:endParaRPr lang="en-US"/>
           </a:p>
@@ -1832,7 +1831,7 @@
           <a:p>
             <a:fld id="{75F949A0-D2CF-4D20-B375-7E5A618C650D}" type="datetimeFigureOut">
               <a:rPr lang="en-US" smtClean="0"/>
-              <a:t>11/18/2024</a:t>
+              <a:t>11/21/2024</a:t>
             </a:fld>
             <a:endParaRPr lang="en-US"/>
           </a:p>
@@ -1973,7 +1972,7 @@
           <a:p>
             <a:fld id="{75F949A0-D2CF-4D20-B375-7E5A618C650D}" type="datetimeFigureOut">
               <a:rPr lang="en-US" smtClean="0"/>
-              <a:t>11/18/2024</a:t>
+              <a:t>11/21/2024</a:t>
             </a:fld>
             <a:endParaRPr lang="en-US"/>
           </a:p>
@@ -2086,7 +2085,7 @@
           <a:p>
             <a:fld id="{75F949A0-D2CF-4D20-B375-7E5A618C650D}" type="datetimeFigureOut">
               <a:rPr lang="en-US" smtClean="0"/>
-              <a:t>11/18/2024</a:t>
+              <a:t>11/21/2024</a:t>
             </a:fld>
             <a:endParaRPr lang="en-US"/>
           </a:p>
@@ -2397,7 +2396,7 @@
           <a:p>
             <a:fld id="{75F949A0-D2CF-4D20-B375-7E5A618C650D}" type="datetimeFigureOut">
               <a:rPr lang="en-US" smtClean="0"/>
-              <a:t>11/18/2024</a:t>
+              <a:t>11/21/2024</a:t>
             </a:fld>
             <a:endParaRPr lang="en-US"/>
           </a:p>
@@ -2685,7 +2684,7 @@
           <a:p>
             <a:fld id="{75F949A0-D2CF-4D20-B375-7E5A618C650D}" type="datetimeFigureOut">
               <a:rPr lang="en-US" smtClean="0"/>
-              <a:t>11/18/2024</a:t>
+              <a:t>11/21/2024</a:t>
             </a:fld>
             <a:endParaRPr lang="en-US"/>
           </a:p>
@@ -2926,7 +2925,7 @@
           <a:p>
             <a:fld id="{75F949A0-D2CF-4D20-B375-7E5A618C650D}" type="datetimeFigureOut">
               <a:rPr lang="en-US" smtClean="0"/>
-              <a:t>11/18/2024</a:t>
+              <a:t>11/21/2024</a:t>
             </a:fld>
             <a:endParaRPr lang="en-US"/>
           </a:p>
@@ -3434,127 +3433,6 @@
           <p:cNvPr id="2" name="Title 1">
             <a:extLst>
               <a:ext uri="{FF2B5EF4-FFF2-40B4-BE49-F238E27FC236}">
-                <a16:creationId xmlns:a16="http://schemas.microsoft.com/office/drawing/2014/main" id="{D105FAB7-09AA-E560-42EF-3CFA0800CC7A}"/>
-              </a:ext>
-            </a:extLst>
-          </p:cNvPr>
-          <p:cNvSpPr>
-            <a:spLocks noGrp="1"/>
-          </p:cNvSpPr>
-          <p:nvPr>
-            <p:ph type="title"/>
-          </p:nvPr>
-        </p:nvSpPr>
-        <p:spPr/>
-        <p:txBody>
-          <a:bodyPr/>
-          <a:lstStyle/>
-          <a:p>
-            <a:r>
-              <a:rPr lang="en-US" dirty="0"/>
-              <a:t>Key functions</a:t>
-            </a:r>
-          </a:p>
-        </p:txBody>
-      </p:sp>
-      <p:sp>
-        <p:nvSpPr>
-          <p:cNvPr id="3" name="Content Placeholder 2">
-            <a:extLst>
-              <a:ext uri="{FF2B5EF4-FFF2-40B4-BE49-F238E27FC236}">
-                <a16:creationId xmlns:a16="http://schemas.microsoft.com/office/drawing/2014/main" id="{6943C225-8D78-18F5-8C98-7B067CC09F77}"/>
-              </a:ext>
-            </a:extLst>
-          </p:cNvPr>
-          <p:cNvSpPr>
-            <a:spLocks noGrp="1"/>
-          </p:cNvSpPr>
-          <p:nvPr>
-            <p:ph idx="1"/>
-          </p:nvPr>
-        </p:nvSpPr>
-        <p:spPr>
-          <a:xfrm>
-            <a:off x="1175084" y="4073235"/>
-            <a:ext cx="9203575" cy="2103727"/>
-          </a:xfrm>
-        </p:spPr>
-        <p:txBody>
-          <a:bodyPr/>
-          <a:lstStyle/>
-          <a:p>
-            <a:r>
-              <a:rPr lang="en-US" dirty="0"/>
-              <a:t>Subjects are stored in each quote of each student and the discounts are automatically calculated.</a:t>
-            </a:r>
-          </a:p>
-        </p:txBody>
-      </p:sp>
-      <p:pic>
-        <p:nvPicPr>
-          <p:cNvPr id="5" name="Picture 4">
-            <a:extLst>
-              <a:ext uri="{FF2B5EF4-FFF2-40B4-BE49-F238E27FC236}">
-                <a16:creationId xmlns:a16="http://schemas.microsoft.com/office/drawing/2014/main" id="{41DE5FCB-2E92-F1E7-8566-E4C7FC38BDB3}"/>
-              </a:ext>
-            </a:extLst>
-          </p:cNvPr>
-          <p:cNvPicPr>
-            <a:picLocks noChangeAspect="1"/>
-          </p:cNvPicPr>
-          <p:nvPr/>
-        </p:nvPicPr>
-        <p:blipFill>
-          <a:blip r:embed="rId2"/>
-          <a:stretch>
-            <a:fillRect/>
-          </a:stretch>
-        </p:blipFill>
-        <p:spPr>
-          <a:xfrm>
-            <a:off x="1131263" y="1685083"/>
-            <a:ext cx="9496338" cy="2164360"/>
-          </a:xfrm>
-          <a:prstGeom prst="rect">
-            <a:avLst/>
-          </a:prstGeom>
-        </p:spPr>
-      </p:pic>
-    </p:spTree>
-    <p:extLst>
-      <p:ext uri="{BB962C8B-B14F-4D97-AF65-F5344CB8AC3E}">
-        <p14:creationId xmlns:p14="http://schemas.microsoft.com/office/powerpoint/2010/main" val="2480201287"/>
-      </p:ext>
-    </p:extLst>
-  </p:cSld>
-  <p:clrMapOvr>
-    <a:masterClrMapping/>
-  </p:clrMapOvr>
-</p:sld>
-</file>
-
-<file path=ppt/slides/slide11.xml><?xml version="1.0" encoding="utf-8"?>
-<p:sld xmlns:a="http://schemas.openxmlformats.org/drawingml/2006/main" xmlns:r="http://schemas.openxmlformats.org/officeDocument/2006/relationships" xmlns:p="http://schemas.openxmlformats.org/presentationml/2006/main">
-  <p:cSld>
-    <p:spTree>
-      <p:nvGrpSpPr>
-        <p:cNvPr id="1" name=""/>
-        <p:cNvGrpSpPr/>
-        <p:nvPr/>
-      </p:nvGrpSpPr>
-      <p:grpSpPr>
-        <a:xfrm>
-          <a:off x="0" y="0"/>
-          <a:ext cx="0" cy="0"/>
-          <a:chOff x="0" y="0"/>
-          <a:chExt cx="0" cy="0"/>
-        </a:xfrm>
-      </p:grpSpPr>
-      <p:sp>
-        <p:nvSpPr>
-          <p:cNvPr id="2" name="Title 1">
-            <a:extLst>
-              <a:ext uri="{FF2B5EF4-FFF2-40B4-BE49-F238E27FC236}">
                 <a16:creationId xmlns:a16="http://schemas.microsoft.com/office/drawing/2014/main" id="{C8E2DB4D-8A8A-3577-0A3E-211269DB9AE1}"/>
               </a:ext>
             </a:extLst>
@@ -3660,7 +3538,7 @@
 </p:sld>
 </file>
 
-<file path=ppt/slides/slide12.xml><?xml version="1.0" encoding="utf-8"?>
+<file path=ppt/slides/slide11.xml><?xml version="1.0" encoding="utf-8"?>
 <p:sld xmlns:a="http://schemas.openxmlformats.org/drawingml/2006/main" xmlns:r="http://schemas.openxmlformats.org/officeDocument/2006/relationships" xmlns:p="http://schemas.openxmlformats.org/presentationml/2006/main">
   <p:cSld>
     <p:spTree>
@@ -3946,7 +3824,7 @@
 </p:sld>
 </file>
 
-<file path=ppt/slides/slide13.xml><?xml version="1.0" encoding="utf-8"?>
+<file path=ppt/slides/slide12.xml><?xml version="1.0" encoding="utf-8"?>
 <p:sld xmlns:a="http://schemas.openxmlformats.org/drawingml/2006/main" xmlns:r="http://schemas.openxmlformats.org/officeDocument/2006/relationships" xmlns:p="http://schemas.openxmlformats.org/presentationml/2006/main">
   <p:cSld>
     <p:spTree>
@@ -4067,7 +3945,7 @@
 </p:sld>
 </file>
 
-<file path=ppt/slides/slide14.xml><?xml version="1.0" encoding="utf-8"?>
+<file path=ppt/slides/slide13.xml><?xml version="1.0" encoding="utf-8"?>
 <p:sld xmlns:a="http://schemas.openxmlformats.org/drawingml/2006/main" xmlns:r="http://schemas.openxmlformats.org/officeDocument/2006/relationships" xmlns:p="http://schemas.openxmlformats.org/presentationml/2006/main">
   <p:cSld>
     <p:spTree>
@@ -4190,7 +4068,7 @@
 </p:sld>
 </file>
 
-<file path=ppt/slides/slide15.xml><?xml version="1.0" encoding="utf-8"?>
+<file path=ppt/slides/slide14.xml><?xml version="1.0" encoding="utf-8"?>
 <p:sld xmlns:a="http://schemas.openxmlformats.org/drawingml/2006/main" xmlns:r="http://schemas.openxmlformats.org/officeDocument/2006/relationships" xmlns:p="http://schemas.openxmlformats.org/presentationml/2006/main">
   <p:cSld>
     <p:spTree>
@@ -4458,7 +4336,7 @@
           <a:p>
             <a:r>
               <a:rPr lang="en-US" dirty="0"/>
-              <a:t>PDF of quote stored in each Quote PDFs section.</a:t>
+              <a:t>PDF of quote stored in the Quote PDFs section.</a:t>
             </a:r>
           </a:p>
         </p:txBody>
@@ -4476,7 +4354,7 @@
 </p:sld>
 </file>
 
-<file path=ppt/slides/slide16.xml><?xml version="1.0" encoding="utf-8"?>
+<file path=ppt/slides/slide15.xml><?xml version="1.0" encoding="utf-8"?>
 <p:sld xmlns:a="http://schemas.openxmlformats.org/drawingml/2006/main" xmlns:r="http://schemas.openxmlformats.org/officeDocument/2006/relationships" xmlns:p="http://schemas.openxmlformats.org/presentationml/2006/main">
   <p:cSld>
     <p:spTree>
@@ -4628,7 +4506,7 @@
 </p:sld>
 </file>
 
-<file path=ppt/slides/slide17.xml><?xml version="1.0" encoding="utf-8"?>
+<file path=ppt/slides/slide16.xml><?xml version="1.0" encoding="utf-8"?>
 <p:sld xmlns:a="http://schemas.openxmlformats.org/drawingml/2006/main" xmlns:r="http://schemas.openxmlformats.org/officeDocument/2006/relationships" xmlns:p="http://schemas.openxmlformats.org/presentationml/2006/main">
   <p:cSld>
     <p:spTree>
@@ -4701,7 +4579,7 @@
           <a:p>
             <a:r>
               <a:rPr lang="en-US" dirty="0"/>
-              <a:t>Development was rushed and no well planned.</a:t>
+              <a:t>Development was rushed and not well planned.</a:t>
             </a:r>
           </a:p>
           <a:p>
@@ -4752,7 +4630,7 @@
 </p:sld>
 </file>
 
-<file path=ppt/slides/slide18.xml><?xml version="1.0" encoding="utf-8"?>
+<file path=ppt/slides/slide17.xml><?xml version="1.0" encoding="utf-8"?>
 <p:sld xmlns:a="http://schemas.openxmlformats.org/drawingml/2006/main" xmlns:r="http://schemas.openxmlformats.org/officeDocument/2006/relationships" xmlns:p="http://schemas.openxmlformats.org/presentationml/2006/main">
   <p:cSld>
     <p:spTree>
@@ -5434,86 +5312,6 @@
           <p:cNvPr id="2" name="Title 1">
             <a:extLst>
               <a:ext uri="{FF2B5EF4-FFF2-40B4-BE49-F238E27FC236}">
-                <a16:creationId xmlns:a16="http://schemas.microsoft.com/office/drawing/2014/main" id="{E330C614-A710-022B-5A6D-889F9F30F786}"/>
-              </a:ext>
-            </a:extLst>
-          </p:cNvPr>
-          <p:cNvSpPr>
-            <a:spLocks noGrp="1"/>
-          </p:cNvSpPr>
-          <p:nvPr>
-            <p:ph type="title"/>
-          </p:nvPr>
-        </p:nvSpPr>
-        <p:spPr/>
-        <p:txBody>
-          <a:bodyPr/>
-          <a:lstStyle/>
-          <a:p>
-            <a:endParaRPr lang="en-US"/>
-          </a:p>
-        </p:txBody>
-      </p:sp>
-      <p:sp>
-        <p:nvSpPr>
-          <p:cNvPr id="3" name="Content Placeholder 2">
-            <a:extLst>
-              <a:ext uri="{FF2B5EF4-FFF2-40B4-BE49-F238E27FC236}">
-                <a16:creationId xmlns:a16="http://schemas.microsoft.com/office/drawing/2014/main" id="{8E13D241-C3A4-C3FA-6568-767BF79AD331}"/>
-              </a:ext>
-            </a:extLst>
-          </p:cNvPr>
-          <p:cNvSpPr>
-            <a:spLocks noGrp="1"/>
-          </p:cNvSpPr>
-          <p:nvPr>
-            <p:ph idx="1"/>
-          </p:nvPr>
-        </p:nvSpPr>
-        <p:spPr/>
-        <p:txBody>
-          <a:bodyPr/>
-          <a:lstStyle/>
-          <a:p>
-            <a:endParaRPr lang="en-US"/>
-          </a:p>
-        </p:txBody>
-      </p:sp>
-    </p:spTree>
-    <p:extLst>
-      <p:ext uri="{BB962C8B-B14F-4D97-AF65-F5344CB8AC3E}">
-        <p14:creationId xmlns:p14="http://schemas.microsoft.com/office/powerpoint/2010/main" val="2694069367"/>
-      </p:ext>
-    </p:extLst>
-  </p:cSld>
-  <p:clrMapOvr>
-    <a:masterClrMapping/>
-  </p:clrMapOvr>
-</p:sld>
-</file>
-
-<file path=ppt/slides/slide7.xml><?xml version="1.0" encoding="utf-8"?>
-<p:sld xmlns:a="http://schemas.openxmlformats.org/drawingml/2006/main" xmlns:r="http://schemas.openxmlformats.org/officeDocument/2006/relationships" xmlns:p="http://schemas.openxmlformats.org/presentationml/2006/main">
-  <p:cSld>
-    <p:spTree>
-      <p:nvGrpSpPr>
-        <p:cNvPr id="1" name=""/>
-        <p:cNvGrpSpPr/>
-        <p:nvPr/>
-      </p:nvGrpSpPr>
-      <p:grpSpPr>
-        <a:xfrm>
-          <a:off x="0" y="0"/>
-          <a:ext cx="0" cy="0"/>
-          <a:chOff x="0" y="0"/>
-          <a:chExt cx="0" cy="0"/>
-        </a:xfrm>
-      </p:grpSpPr>
-      <p:sp>
-        <p:nvSpPr>
-          <p:cNvPr id="2" name="Title 1">
-            <a:extLst>
-              <a:ext uri="{FF2B5EF4-FFF2-40B4-BE49-F238E27FC236}">
                 <a16:creationId xmlns:a16="http://schemas.microsoft.com/office/drawing/2014/main" id="{352116CB-25D1-E21A-7BD6-C57FA34C6B8D}"/>
               </a:ext>
             </a:extLst>
@@ -5649,7 +5447,7 @@
 </p:sld>
 </file>
 
-<file path=ppt/slides/slide8.xml><?xml version="1.0" encoding="utf-8"?>
+<file path=ppt/slides/slide7.xml><?xml version="1.0" encoding="utf-8"?>
 <p:sld xmlns:a="http://schemas.openxmlformats.org/drawingml/2006/main" xmlns:r="http://schemas.openxmlformats.org/officeDocument/2006/relationships" xmlns:p="http://schemas.openxmlformats.org/presentationml/2006/main">
   <p:cSld>
     <p:spTree>
@@ -5770,7 +5568,7 @@
 </p:sld>
 </file>
 
-<file path=ppt/slides/slide9.xml><?xml version="1.0" encoding="utf-8"?>
+<file path=ppt/slides/slide8.xml><?xml version="1.0" encoding="utf-8"?>
 <p:sld xmlns:a="http://schemas.openxmlformats.org/drawingml/2006/main" xmlns:r="http://schemas.openxmlformats.org/officeDocument/2006/relationships" xmlns:p="http://schemas.openxmlformats.org/presentationml/2006/main">
   <p:cSld>
     <p:spTree>
@@ -5882,6 +5680,127 @@
     <p:extLst>
       <p:ext uri="{BB962C8B-B14F-4D97-AF65-F5344CB8AC3E}">
         <p14:creationId xmlns:p14="http://schemas.microsoft.com/office/powerpoint/2010/main" val="1171267231"/>
+      </p:ext>
+    </p:extLst>
+  </p:cSld>
+  <p:clrMapOvr>
+    <a:masterClrMapping/>
+  </p:clrMapOvr>
+</p:sld>
+</file>
+
+<file path=ppt/slides/slide9.xml><?xml version="1.0" encoding="utf-8"?>
+<p:sld xmlns:a="http://schemas.openxmlformats.org/drawingml/2006/main" xmlns:r="http://schemas.openxmlformats.org/officeDocument/2006/relationships" xmlns:p="http://schemas.openxmlformats.org/presentationml/2006/main">
+  <p:cSld>
+    <p:spTree>
+      <p:nvGrpSpPr>
+        <p:cNvPr id="1" name=""/>
+        <p:cNvGrpSpPr/>
+        <p:nvPr/>
+      </p:nvGrpSpPr>
+      <p:grpSpPr>
+        <a:xfrm>
+          <a:off x="0" y="0"/>
+          <a:ext cx="0" cy="0"/>
+          <a:chOff x="0" y="0"/>
+          <a:chExt cx="0" cy="0"/>
+        </a:xfrm>
+      </p:grpSpPr>
+      <p:sp>
+        <p:nvSpPr>
+          <p:cNvPr id="2" name="Title 1">
+            <a:extLst>
+              <a:ext uri="{FF2B5EF4-FFF2-40B4-BE49-F238E27FC236}">
+                <a16:creationId xmlns:a16="http://schemas.microsoft.com/office/drawing/2014/main" id="{D105FAB7-09AA-E560-42EF-3CFA0800CC7A}"/>
+              </a:ext>
+            </a:extLst>
+          </p:cNvPr>
+          <p:cNvSpPr>
+            <a:spLocks noGrp="1"/>
+          </p:cNvSpPr>
+          <p:nvPr>
+            <p:ph type="title"/>
+          </p:nvPr>
+        </p:nvSpPr>
+        <p:spPr/>
+        <p:txBody>
+          <a:bodyPr/>
+          <a:lstStyle/>
+          <a:p>
+            <a:r>
+              <a:rPr lang="en-US" dirty="0"/>
+              <a:t>Key functions</a:t>
+            </a:r>
+          </a:p>
+        </p:txBody>
+      </p:sp>
+      <p:sp>
+        <p:nvSpPr>
+          <p:cNvPr id="3" name="Content Placeholder 2">
+            <a:extLst>
+              <a:ext uri="{FF2B5EF4-FFF2-40B4-BE49-F238E27FC236}">
+                <a16:creationId xmlns:a16="http://schemas.microsoft.com/office/drawing/2014/main" id="{6943C225-8D78-18F5-8C98-7B067CC09F77}"/>
+              </a:ext>
+            </a:extLst>
+          </p:cNvPr>
+          <p:cNvSpPr>
+            <a:spLocks noGrp="1"/>
+          </p:cNvSpPr>
+          <p:nvPr>
+            <p:ph idx="1"/>
+          </p:nvPr>
+        </p:nvSpPr>
+        <p:spPr>
+          <a:xfrm>
+            <a:off x="1175084" y="4073235"/>
+            <a:ext cx="9203575" cy="2103727"/>
+          </a:xfrm>
+        </p:spPr>
+        <p:txBody>
+          <a:bodyPr/>
+          <a:lstStyle/>
+          <a:p>
+            <a:r>
+              <a:rPr lang="en-US" dirty="0"/>
+              <a:t>Subjects are stored in each quote of each student and the discounts are automatically calculated.</a:t>
+            </a:r>
+          </a:p>
+        </p:txBody>
+      </p:sp>
+      <p:pic>
+        <p:nvPicPr>
+          <p:cNvPr id="5" name="Picture 4">
+            <a:extLst>
+              <a:ext uri="{FF2B5EF4-FFF2-40B4-BE49-F238E27FC236}">
+                <a16:creationId xmlns:a16="http://schemas.microsoft.com/office/drawing/2014/main" id="{41DE5FCB-2E92-F1E7-8566-E4C7FC38BDB3}"/>
+              </a:ext>
+            </a:extLst>
+          </p:cNvPr>
+          <p:cNvPicPr>
+            <a:picLocks noChangeAspect="1"/>
+          </p:cNvPicPr>
+          <p:nvPr/>
+        </p:nvPicPr>
+        <p:blipFill>
+          <a:blip r:embed="rId2"/>
+          <a:stretch>
+            <a:fillRect/>
+          </a:stretch>
+        </p:blipFill>
+        <p:spPr>
+          <a:xfrm>
+            <a:off x="1131263" y="1685083"/>
+            <a:ext cx="9496338" cy="2164360"/>
+          </a:xfrm>
+          <a:prstGeom prst="rect">
+            <a:avLst/>
+          </a:prstGeom>
+        </p:spPr>
+      </p:pic>
+    </p:spTree>
+    <p:extLst>
+      <p:ext uri="{BB962C8B-B14F-4D97-AF65-F5344CB8AC3E}">
+        <p14:creationId xmlns:p14="http://schemas.microsoft.com/office/powerpoint/2010/main" val="2480201287"/>
       </p:ext>
     </p:extLst>
   </p:cSld>

</xml_diff>

<commit_message>
Delete empty slide and improve grammar.
</commit_message>
<xml_diff>
--- a/presentation/salesforce_presentation.pptx
+++ b/presentation/salesforce_presentation.pptx
@@ -4867,7 +4867,15 @@
           <a:p>
             <a:r>
               <a:rPr lang="en-US" dirty="0"/>
-              <a:t>Create custom objects if needed and custom fields for storing student’s information as well as quote information.</a:t>
+              <a:t>Create custom objects if needed </a:t>
+            </a:r>
+            <a:r>
+              <a:rPr lang="en-US"/>
+              <a:t>and create custom </a:t>
+            </a:r>
+            <a:r>
+              <a:rPr lang="en-US" dirty="0"/>
+              <a:t>fields for storing student’s information as well as quote information.</a:t>
             </a:r>
           </a:p>
           <a:p>

</xml_diff>